<commit_message>
modified files to support new templates
</commit_message>
<xml_diff>
--- a/templates/MasterTemplate.pptx
+++ b/templates/MasterTemplate.pptx
@@ -2,15 +2,15 @@
 <file path=ppt/presentation.xml><?xml version="1.0" encoding="utf-8"?>
 <p:presentation xmlns:a="http://schemas.openxmlformats.org/drawingml/2006/main" xmlns:r="http://schemas.openxmlformats.org/officeDocument/2006/relationships" xmlns:p="http://schemas.openxmlformats.org/presentationml/2006/main" removePersonalInfoOnSave="1" autoCompressPictures="0">
   <p:sldMasterIdLst>
-    <p:sldMasterId id="2147483648" r:id="rId1"/>
+    <p:sldMasterId id="2147483648" r:id="rId4"/>
   </p:sldMasterIdLst>
   <p:notesMasterIdLst>
-    <p:notesMasterId r:id="rId3"/>
+    <p:notesMasterId r:id="rId5"/>
   </p:notesMasterIdLst>
   <p:sldSz cx="12192000" cy="6858000"/>
   <p:notesSz cx="6858000" cy="9144000"/>
   <p:custDataLst>
-    <p:tags r:id="rId10"/>
+    <p:tags r:id="rId6"/>
   </p:custDataLst>
   <p:defaultTextStyle>
     <a:defPPr>
@@ -345,7 +345,6 @@
               <a:rPr lang="en-US" noProof="0"/>
               <a:t>Click to edit Master text styles</a:t>
             </a:r>
-            <a:endParaRPr lang="en-US" noProof="0"/>
           </a:p>
           <a:p>
             <a:pPr lvl="1"/>
@@ -353,7 +352,6 @@
               <a:rPr lang="en-US" noProof="0"/>
               <a:t>Second level</a:t>
             </a:r>
-            <a:endParaRPr lang="en-US" noProof="0"/>
           </a:p>
           <a:p>
             <a:pPr lvl="2"/>
@@ -361,7 +359,6 @@
               <a:rPr lang="en-US" noProof="0"/>
               <a:t>Third level</a:t>
             </a:r>
-            <a:endParaRPr lang="en-US" noProof="0"/>
           </a:p>
           <a:p>
             <a:pPr lvl="3"/>
@@ -369,7 +366,6 @@
               <a:rPr lang="en-US" noProof="0"/>
               <a:t>Fourth level</a:t>
             </a:r>
-            <a:endParaRPr lang="en-US" noProof="0"/>
           </a:p>
           <a:p>
             <a:pPr lvl="4"/>
@@ -377,7 +373,6 @@
               <a:rPr lang="en-US" noProof="0"/>
               <a:t>Fifth level</a:t>
             </a:r>
-            <a:endParaRPr lang="en-US" noProof="0"/>
           </a:p>
         </p:txBody>
       </p:sp>
@@ -458,6 +453,7 @@
           <a:p>
             <a:fld id="{6DEB7EE2-04A2-4FB2-9625-C9C73AC4D32F}" type="slidenum">
               <a:rPr lang="en-US" altLang="en-US"/>
+              <a:t>‹#›</a:t>
             </a:fld>
             <a:endParaRPr lang="en-US" altLang="en-US" dirty="0"/>
           </a:p>
@@ -593,7 +589,7 @@
 
 <file path=ppt/slideLayouts/slideLayout1.xml><?xml version="1.0" encoding="utf-8"?>
 <p:sldLayout xmlns:a="http://schemas.openxmlformats.org/drawingml/2006/main" xmlns:r="http://schemas.openxmlformats.org/officeDocument/2006/relationships" xmlns:p="http://schemas.openxmlformats.org/presentationml/2006/main" preserve="1" userDrawn="1">
-  <p:cSld name="Title ">
+  <p:cSld name="Title Only">
     <p:spTree>
       <p:nvGrpSpPr>
         <p:cNvPr id="1" name=""/>
@@ -639,7 +635,6 @@
               <a:rPr lang="en-US" dirty="0"/>
               <a:t>Insert title here</a:t>
             </a:r>
-            <a:endParaRPr lang="en-US" dirty="0"/>
           </a:p>
         </p:txBody>
       </p:sp>
@@ -676,180 +671,9 @@
 </p:sldLayout>
 </file>
 
-<file path=ppt/slideLayouts/slideLayout10.xml><?xml version="1.0" encoding="utf-8"?>
-<p:sldLayout xmlns:a="http://schemas.openxmlformats.org/drawingml/2006/main" xmlns:r="http://schemas.openxmlformats.org/officeDocument/2006/relationships" xmlns:p="http://schemas.openxmlformats.org/presentationml/2006/main" preserve="1" userDrawn="1">
-  <p:cSld name="Left Pattern Content Orange Title">
-    <p:spTree>
-      <p:nvGrpSpPr>
-        <p:cNvPr id="1" name=""/>
-        <p:cNvGrpSpPr/>
-        <p:nvPr/>
-      </p:nvGrpSpPr>
-      <p:grpSpPr>
-        <a:xfrm>
-          <a:off x="0" y="0"/>
-          <a:ext cx="0" cy="0"/>
-          <a:chOff x="0" y="0"/>
-          <a:chExt cx="0" cy="0"/>
-        </a:xfrm>
-      </p:grpSpPr>
-      <p:sp>
-        <p:nvSpPr>
-          <p:cNvPr id="3" name="Title 2"/>
-          <p:cNvSpPr>
-            <a:spLocks noGrp="1"/>
-          </p:cNvSpPr>
-          <p:nvPr>
-            <p:ph type="title" hasCustomPrompt="1"/>
-          </p:nvPr>
-        </p:nvSpPr>
-        <p:spPr>
-          <a:xfrm>
-            <a:off x="5199742" y="715961"/>
-            <a:ext cx="6477000" cy="1189037"/>
-          </a:xfrm>
-          <a:prstGeom prst="rect">
-            <a:avLst/>
-          </a:prstGeom>
-        </p:spPr>
-        <p:txBody>
-          <a:bodyPr anchor="t">
-            <a:normAutofit/>
-          </a:bodyPr>
-          <a:lstStyle>
-            <a:lvl1pPr>
-              <a:spcBef>
-                <a:spcPts val="1000"/>
-              </a:spcBef>
-              <a:defRPr sz="4000" b="1" spc="-50" baseline="0">
-                <a:solidFill>
-                  <a:schemeClr val="bg2"/>
-                </a:solidFill>
-              </a:defRPr>
-            </a:lvl1pPr>
-          </a:lstStyle>
-          <a:p>
-            <a:r>
-              <a:rPr lang="en-US" dirty="0"/>
-              <a:t>Insert title here</a:t>
-            </a:r>
-            <a:endParaRPr lang="en-US" dirty="0"/>
-          </a:p>
-        </p:txBody>
-      </p:sp>
-      <p:sp>
-        <p:nvSpPr>
-          <p:cNvPr id="12" name="Text Placeholder 15"/>
-          <p:cNvSpPr>
-            <a:spLocks noGrp="1"/>
-          </p:cNvSpPr>
-          <p:nvPr>
-            <p:ph type="body" sz="quarter" idx="11" hasCustomPrompt="1"/>
-          </p:nvPr>
-        </p:nvSpPr>
-        <p:spPr>
-          <a:xfrm>
-            <a:off x="5199743" y="1905000"/>
-            <a:ext cx="6477000" cy="3276600"/>
-          </a:xfrm>
-          <a:prstGeom prst="rect">
-            <a:avLst/>
-          </a:prstGeom>
-        </p:spPr>
-        <p:txBody>
-          <a:bodyPr/>
-          <a:lstStyle>
-            <a:lvl1pPr marL="0" indent="0">
-              <a:lnSpc>
-                <a:spcPct val="100000"/>
-              </a:lnSpc>
-              <a:buNone/>
-              <a:defRPr sz="1800" b="1">
-                <a:solidFill>
-                  <a:schemeClr val="bg1"/>
-                </a:solidFill>
-              </a:defRPr>
-            </a:lvl1pPr>
-            <a:lvl2pPr marL="228600" indent="-228600">
-              <a:lnSpc>
-                <a:spcPct val="100000"/>
-              </a:lnSpc>
-              <a:spcBef>
-                <a:spcPts val="1000"/>
-              </a:spcBef>
-              <a:defRPr sz="1800">
-                <a:solidFill>
-                  <a:schemeClr val="bg1"/>
-                </a:solidFill>
-              </a:defRPr>
-            </a:lvl2pPr>
-          </a:lstStyle>
-          <a:p>
-            <a:pPr lvl="0"/>
-            <a:r>
-              <a:rPr lang="en-US" dirty="0"/>
-              <a:t>Insert subtitle here</a:t>
-            </a:r>
-            <a:endParaRPr lang="en-US" dirty="0"/>
-          </a:p>
-          <a:p>
-            <a:pPr lvl="1"/>
-            <a:r>
-              <a:rPr lang="en-US" dirty="0"/>
-              <a:t>Insert content here</a:t>
-            </a:r>
-            <a:endParaRPr lang="en-US" dirty="0"/>
-          </a:p>
-        </p:txBody>
-      </p:sp>
-      <p:pic>
-        <p:nvPicPr>
-          <p:cNvPr id="5" name="Picture Placeholder 13" descr="Bright, colorful geometric pattern "/>
-          <p:cNvPicPr>
-            <a:picLocks noChangeAspect="1"/>
-          </p:cNvPicPr>
-          <p:nvPr userDrawn="1"/>
-        </p:nvPicPr>
-        <p:blipFill rotWithShape="1">
-          <a:blip r:embed="rId2"/>
-          <a:srcRect l="34" r="34"/>
-          <a:stretch>
-            <a:fillRect/>
-          </a:stretch>
-        </p:blipFill>
-        <p:spPr>
-          <a:xfrm>
-            <a:off x="0" y="0"/>
-            <a:ext cx="4767943" cy="6858000"/>
-          </a:xfrm>
-          <a:prstGeom prst="rect">
-            <a:avLst/>
-          </a:prstGeom>
-        </p:spPr>
-      </p:pic>
-    </p:spTree>
-  </p:cSld>
-  <p:clrMapOvr>
-    <a:masterClrMapping/>
-  </p:clrMapOvr>
-  <mc:AlternateContent xmlns:mc="http://schemas.openxmlformats.org/markup-compatibility/2006">
-    <mc:Choice xmlns:p14="http://schemas.microsoft.com/office/powerpoint/2010/main" Requires="p14">
-      <p:transition spd="med" p14:dur="700">
-        <p:fade/>
-      </p:transition>
-    </mc:Choice>
-    <mc:Fallback>
-      <p:transition spd="med">
-        <p:fade/>
-      </p:transition>
-    </mc:Fallback>
-  </mc:AlternateContent>
-</p:sldLayout>
-</file>
-
 <file path=ppt/slideLayouts/slideLayout2.xml><?xml version="1.0" encoding="utf-8"?>
 <p:sldLayout xmlns:a="http://schemas.openxmlformats.org/drawingml/2006/main" xmlns:r="http://schemas.openxmlformats.org/officeDocument/2006/relationships" xmlns:p="http://schemas.openxmlformats.org/presentationml/2006/main" preserve="1" userDrawn="1">
-  <p:cSld name="Right Pattern Content">
+  <p:cSld name="Title and Content">
     <p:spTree>
       <p:nvGrpSpPr>
         <p:cNvPr id="1" name=""/>
@@ -904,7 +728,6 @@
               <a:rPr lang="en-US" dirty="0"/>
               <a:t>Insert title here</a:t>
             </a:r>
-            <a:endParaRPr lang="en-US" dirty="0"/>
           </a:p>
         </p:txBody>
       </p:sp>
@@ -961,7 +784,6 @@
               <a:rPr lang="en-US" dirty="0"/>
               <a:t>Insert subtitle here</a:t>
             </a:r>
-            <a:endParaRPr lang="en-US" dirty="0"/>
           </a:p>
           <a:p>
             <a:pPr lvl="1"/>
@@ -969,7 +791,6 @@
               <a:rPr lang="en-US" dirty="0"/>
               <a:t>Insert content here</a:t>
             </a:r>
-            <a:endParaRPr lang="en-US" dirty="0"/>
           </a:p>
         </p:txBody>
       </p:sp>
@@ -1003,13 +824,13 @@
   <p:clrMapOvr>
     <a:masterClrMapping/>
   </p:clrMapOvr>
-  <mc:AlternateContent xmlns:mc="http://schemas.openxmlformats.org/markup-compatibility/2006">
-    <mc:Choice xmlns:p14="http://schemas.microsoft.com/office/powerpoint/2010/main" Requires="p14">
+  <mc:AlternateContent xmlns:mc="http://schemas.openxmlformats.org/markup-compatibility/2006" xmlns:p14="http://schemas.microsoft.com/office/powerpoint/2010/main">
+    <mc:Choice Requires="p14">
       <p:transition spd="med" p14:dur="700">
         <p:fade/>
       </p:transition>
     </mc:Choice>
-    <mc:Fallback>
+    <mc:Fallback xmlns="">
       <p:transition spd="med">
         <p:fade/>
       </p:transition>
@@ -1020,385 +841,7 @@
 
 <file path=ppt/slideLayouts/slideLayout3.xml><?xml version="1.0" encoding="utf-8"?>
 <p:sldLayout xmlns:a="http://schemas.openxmlformats.org/drawingml/2006/main" xmlns:r="http://schemas.openxmlformats.org/officeDocument/2006/relationships" xmlns:p="http://schemas.openxmlformats.org/presentationml/2006/main" preserve="1" userDrawn="1">
-  <p:cSld name="Overview">
-    <p:bg>
-      <p:bgPr>
-        <a:solidFill>
-          <a:schemeClr val="accent5"/>
-        </a:solidFill>
-        <a:effectLst/>
-      </p:bgPr>
-    </p:bg>
-    <p:spTree>
-      <p:nvGrpSpPr>
-        <p:cNvPr id="1" name=""/>
-        <p:cNvGrpSpPr/>
-        <p:nvPr/>
-      </p:nvGrpSpPr>
-      <p:grpSpPr>
-        <a:xfrm>
-          <a:off x="0" y="0"/>
-          <a:ext cx="0" cy="0"/>
-          <a:chOff x="0" y="0"/>
-          <a:chExt cx="0" cy="0"/>
-        </a:xfrm>
-      </p:grpSpPr>
-      <p:pic>
-        <p:nvPicPr>
-          <p:cNvPr id="8" name="Picture Placeholder 9" descr="Bright, colorful geometric pattern "/>
-          <p:cNvPicPr>
-            <a:picLocks noChangeAspect="1"/>
-          </p:cNvPicPr>
-          <p:nvPr userDrawn="1"/>
-        </p:nvPicPr>
-        <p:blipFill rotWithShape="1">
-          <a:blip r:embed="rId2"/>
-          <a:srcRect/>
-          <a:stretch>
-            <a:fillRect/>
-          </a:stretch>
-        </p:blipFill>
-        <p:spPr>
-          <a:xfrm>
-            <a:off x="0" y="0"/>
-            <a:ext cx="12192000" cy="6858000"/>
-          </a:xfrm>
-          <a:prstGeom prst="rect">
-            <a:avLst/>
-          </a:prstGeom>
-        </p:spPr>
-      </p:pic>
-      <p:sp>
-        <p:nvSpPr>
-          <p:cNvPr id="5" name="Title 1"/>
-          <p:cNvSpPr>
-            <a:spLocks noGrp="1"/>
-          </p:cNvSpPr>
-          <p:nvPr>
-            <p:ph type="title" hasCustomPrompt="1"/>
-          </p:nvPr>
-        </p:nvSpPr>
-        <p:spPr>
-          <a:xfrm>
-            <a:off x="1525301" y="1995467"/>
-            <a:ext cx="9141397" cy="615553"/>
-          </a:xfrm>
-          <a:prstGeom prst="rect">
-            <a:avLst/>
-          </a:prstGeom>
-          <a:noFill/>
-        </p:spPr>
-        <p:txBody>
-          <a:bodyPr wrap="square" lIns="0" tIns="0" rIns="0" bIns="0" anchor="b" anchorCtr="0">
-            <a:spAutoFit/>
-          </a:bodyPr>
-          <a:lstStyle>
-            <a:lvl1pPr algn="ctr" defTabSz="932815" rtl="0" eaLnBrk="1" latinLnBrk="0" hangingPunct="1">
-              <a:lnSpc>
-                <a:spcPct val="100000"/>
-              </a:lnSpc>
-              <a:spcBef>
-                <a:spcPct val="0"/>
-              </a:spcBef>
-              <a:buNone/>
-              <a:defRPr lang="en-US" sz="4000" b="1" i="0" kern="1200" cap="none" spc="-50" baseline="0" dirty="0">
-                <a:ln w="3175">
-                  <a:noFill/>
-                </a:ln>
-                <a:solidFill>
-                  <a:schemeClr val="tx1"/>
-                </a:solidFill>
-                <a:effectLst/>
-                <a:latin typeface="+mj-lt"/>
-                <a:ea typeface="+mn-ea"/>
-                <a:cs typeface="Segoe UI" panose="020B0502040204020203" pitchFamily="34" charset="0"/>
-              </a:defRPr>
-            </a:lvl1pPr>
-          </a:lstStyle>
-          <a:p>
-            <a:r>
-              <a:rPr lang="en-US" dirty="0"/>
-              <a:t>Insert title here</a:t>
-            </a:r>
-            <a:endParaRPr lang="en-US" dirty="0"/>
-          </a:p>
-        </p:txBody>
-      </p:sp>
-      <p:sp>
-        <p:nvSpPr>
-          <p:cNvPr id="6" name="Text Placeholder 4"/>
-          <p:cNvSpPr>
-            <a:spLocks noGrp="1"/>
-          </p:cNvSpPr>
-          <p:nvPr>
-            <p:ph type="body" sz="quarter" idx="12" hasCustomPrompt="1"/>
-          </p:nvPr>
-        </p:nvSpPr>
-        <p:spPr>
-          <a:xfrm>
-            <a:off x="2196307" y="3260705"/>
-            <a:ext cx="7799387" cy="1534757"/>
-          </a:xfrm>
-          <a:prstGeom prst="rect">
-            <a:avLst/>
-          </a:prstGeom>
-          <a:noFill/>
-        </p:spPr>
-        <p:txBody>
-          <a:bodyPr wrap="square" lIns="0" tIns="0" rIns="0" bIns="0">
-            <a:noAutofit/>
-          </a:bodyPr>
-          <a:lstStyle>
-            <a:lvl1pPr marL="0" indent="0" algn="ctr">
-              <a:lnSpc>
-                <a:spcPct val="100000"/>
-              </a:lnSpc>
-              <a:spcBef>
-                <a:spcPts val="0"/>
-              </a:spcBef>
-              <a:spcAft>
-                <a:spcPts val="0"/>
-              </a:spcAft>
-              <a:buFont typeface="Arial" panose="020B0604020202020204" pitchFamily="34" charset="0"/>
-              <a:buNone/>
-              <a:defRPr lang="en-US" sz="1800" kern="1200" dirty="0">
-                <a:solidFill>
-                  <a:schemeClr val="tx1"/>
-                </a:solidFill>
-                <a:latin typeface="+mn-lt"/>
-                <a:ea typeface="+mn-ea"/>
-                <a:cs typeface="+mn-cs"/>
-              </a:defRPr>
-            </a:lvl1pPr>
-          </a:lstStyle>
-          <a:p>
-            <a:pPr lvl="0"/>
-            <a:r>
-              <a:rPr lang="en-US" dirty="0"/>
-              <a:t>Insert content here</a:t>
-            </a:r>
-            <a:endParaRPr lang="en-US" dirty="0"/>
-          </a:p>
-        </p:txBody>
-      </p:sp>
-    </p:spTree>
-  </p:cSld>
-  <p:clrMapOvr>
-    <a:masterClrMapping/>
-  </p:clrMapOvr>
-  <mc:AlternateContent xmlns:mc="http://schemas.openxmlformats.org/markup-compatibility/2006">
-    <mc:Choice xmlns:p14="http://schemas.microsoft.com/office/powerpoint/2010/main" Requires="p14">
-      <p:transition spd="med" p14:dur="700">
-        <p:fade/>
-      </p:transition>
-    </mc:Choice>
-    <mc:Fallback>
-      <p:transition spd="med">
-        <p:fade/>
-      </p:transition>
-    </mc:Fallback>
-  </mc:AlternateContent>
-</p:sldLayout>
-</file>
-
-<file path=ppt/slideLayouts/slideLayout4.xml><?xml version="1.0" encoding="utf-8"?>
-<p:sldLayout xmlns:a="http://schemas.openxmlformats.org/drawingml/2006/main" xmlns:r="http://schemas.openxmlformats.org/officeDocument/2006/relationships" xmlns:p="http://schemas.openxmlformats.org/presentationml/2006/main" preserve="1" userDrawn="1">
-  <p:cSld name="Chart Slide">
-    <p:spTree>
-      <p:nvGrpSpPr>
-        <p:cNvPr id="1" name=""/>
-        <p:cNvGrpSpPr/>
-        <p:nvPr/>
-      </p:nvGrpSpPr>
-      <p:grpSpPr>
-        <a:xfrm>
-          <a:off x="0" y="0"/>
-          <a:ext cx="0" cy="0"/>
-          <a:chOff x="0" y="0"/>
-          <a:chExt cx="0" cy="0"/>
-        </a:xfrm>
-      </p:grpSpPr>
-      <p:sp>
-        <p:nvSpPr>
-          <p:cNvPr id="2" name="Title 1"/>
-          <p:cNvSpPr>
-            <a:spLocks noGrp="1"/>
-          </p:cNvSpPr>
-          <p:nvPr>
-            <p:ph type="title" hasCustomPrompt="1"/>
-          </p:nvPr>
-        </p:nvSpPr>
-        <p:spPr>
-          <a:xfrm>
-            <a:off x="762000" y="715964"/>
-            <a:ext cx="10591800" cy="646332"/>
-          </a:xfrm>
-          <a:prstGeom prst="rect">
-            <a:avLst/>
-          </a:prstGeom>
-        </p:spPr>
-        <p:txBody>
-          <a:bodyPr>
-            <a:noAutofit/>
-          </a:bodyPr>
-          <a:lstStyle>
-            <a:lvl1pPr>
-              <a:spcBef>
-                <a:spcPts val="1000"/>
-              </a:spcBef>
-              <a:defRPr sz="4000" b="1">
-                <a:solidFill>
-                  <a:schemeClr val="accent5"/>
-                </a:solidFill>
-              </a:defRPr>
-            </a:lvl1pPr>
-          </a:lstStyle>
-          <a:p>
-            <a:r>
-              <a:rPr lang="en-US" dirty="0"/>
-              <a:t>Insert title here</a:t>
-            </a:r>
-            <a:endParaRPr lang="en-US" dirty="0"/>
-          </a:p>
-        </p:txBody>
-      </p:sp>
-      <p:sp>
-        <p:nvSpPr>
-          <p:cNvPr id="10" name="Text Placeholder 15"/>
-          <p:cNvSpPr>
-            <a:spLocks noGrp="1"/>
-          </p:cNvSpPr>
-          <p:nvPr>
-            <p:ph type="body" sz="quarter" idx="11" hasCustomPrompt="1"/>
-          </p:nvPr>
-        </p:nvSpPr>
-        <p:spPr>
-          <a:xfrm>
-            <a:off x="762000" y="1432562"/>
-            <a:ext cx="10667999" cy="1158237"/>
-          </a:xfrm>
-          <a:prstGeom prst="rect">
-            <a:avLst/>
-          </a:prstGeom>
-        </p:spPr>
-        <p:txBody>
-          <a:bodyPr/>
-          <a:lstStyle>
-            <a:lvl1pPr marL="0" indent="0">
-              <a:lnSpc>
-                <a:spcPct val="100000"/>
-              </a:lnSpc>
-              <a:buNone/>
-              <a:defRPr sz="1800" b="0">
-                <a:solidFill>
-                  <a:schemeClr val="bg1"/>
-                </a:solidFill>
-              </a:defRPr>
-            </a:lvl1pPr>
-            <a:lvl2pPr marL="228600">
-              <a:lnSpc>
-                <a:spcPct val="100000"/>
-              </a:lnSpc>
-              <a:spcBef>
-                <a:spcPts val="1000"/>
-              </a:spcBef>
-              <a:defRPr sz="1800" b="0">
-                <a:solidFill>
-                  <a:schemeClr val="bg1"/>
-                </a:solidFill>
-              </a:defRPr>
-            </a:lvl2pPr>
-          </a:lstStyle>
-          <a:p>
-            <a:pPr lvl="0"/>
-            <a:r>
-              <a:rPr lang="en-US" dirty="0"/>
-              <a:t>Insert subtitle here</a:t>
-            </a:r>
-            <a:endParaRPr lang="en-US" dirty="0"/>
-          </a:p>
-          <a:p>
-            <a:pPr lvl="1"/>
-            <a:r>
-              <a:rPr lang="en-US" dirty="0"/>
-              <a:t>Insert content here</a:t>
-            </a:r>
-            <a:endParaRPr lang="en-US" dirty="0"/>
-          </a:p>
-        </p:txBody>
-      </p:sp>
-      <p:sp>
-        <p:nvSpPr>
-          <p:cNvPr id="11" name="Table Placeholder 10"/>
-          <p:cNvSpPr>
-            <a:spLocks noGrp="1"/>
-          </p:cNvSpPr>
-          <p:nvPr>
-            <p:ph type="tbl" sz="quarter" idx="12" hasCustomPrompt="1"/>
-          </p:nvPr>
-        </p:nvSpPr>
-        <p:spPr>
-          <a:xfrm>
-            <a:off x="757381" y="2591662"/>
-            <a:ext cx="10667999" cy="2833776"/>
-          </a:xfrm>
-          <a:prstGeom prst="rect">
-            <a:avLst/>
-          </a:prstGeom>
-        </p:spPr>
-        <p:txBody>
-          <a:bodyPr/>
-          <a:lstStyle>
-            <a:lvl1pPr marL="0" indent="0">
-              <a:buNone/>
-              <a:defRPr sz="1800" b="0"/>
-            </a:lvl1pPr>
-          </a:lstStyle>
-          <a:p>
-            <a:r>
-              <a:rPr lang="en-US" dirty="0"/>
-              <a:t>Insert content here</a:t>
-            </a:r>
-            <a:endParaRPr lang="en-US" dirty="0"/>
-          </a:p>
-        </p:txBody>
-      </p:sp>
-      <p:pic>
-        <p:nvPicPr>
-          <p:cNvPr id="7" name="Picture Placeholder 20" descr="Bright, colorful geometric pattern "/>
-          <p:cNvPicPr>
-            <a:picLocks noChangeAspect="1"/>
-          </p:cNvPicPr>
-          <p:nvPr userDrawn="1"/>
-        </p:nvPicPr>
-        <p:blipFill rotWithShape="1">
-          <a:blip r:embed="rId2"/>
-          <a:srcRect t="193" b="193"/>
-          <a:stretch>
-            <a:fillRect/>
-          </a:stretch>
-        </p:blipFill>
-        <p:spPr>
-          <a:xfrm>
-            <a:off x="0" y="5990252"/>
-            <a:ext cx="12192000" cy="867748"/>
-          </a:xfrm>
-          <a:prstGeom prst="rect">
-            <a:avLst/>
-          </a:prstGeom>
-        </p:spPr>
-      </p:pic>
-    </p:spTree>
-  </p:cSld>
-  <p:clrMapOvr>
-    <a:masterClrMapping/>
-  </p:clrMapOvr>
-</p:sldLayout>
-</file>
-
-<file path=ppt/slideLayouts/slideLayout5.xml><?xml version="1.0" encoding="utf-8"?>
-<p:sldLayout xmlns:a="http://schemas.openxmlformats.org/drawingml/2006/main" xmlns:r="http://schemas.openxmlformats.org/officeDocument/2006/relationships" xmlns:p="http://schemas.openxmlformats.org/presentationml/2006/main" preserve="1" userDrawn="1">
-  <p:cSld name="Left Pattern Content">
+  <p:cSld name="Title and Picture">
     <p:spTree>
       <p:nvGrpSpPr>
         <p:cNvPr id="1" name=""/>
@@ -1453,72 +896,6 @@
               <a:rPr lang="en-US" dirty="0"/>
               <a:t>Insert title here</a:t>
             </a:r>
-            <a:endParaRPr lang="en-US" dirty="0"/>
-          </a:p>
-        </p:txBody>
-      </p:sp>
-      <p:sp>
-        <p:nvSpPr>
-          <p:cNvPr id="12" name="Text Placeholder 15"/>
-          <p:cNvSpPr>
-            <a:spLocks noGrp="1"/>
-          </p:cNvSpPr>
-          <p:nvPr>
-            <p:ph type="body" sz="quarter" idx="11" hasCustomPrompt="1"/>
-          </p:nvPr>
-        </p:nvSpPr>
-        <p:spPr>
-          <a:xfrm>
-            <a:off x="5199743" y="1905000"/>
-            <a:ext cx="6477000" cy="3276600"/>
-          </a:xfrm>
-          <a:prstGeom prst="rect">
-            <a:avLst/>
-          </a:prstGeom>
-        </p:spPr>
-        <p:txBody>
-          <a:bodyPr/>
-          <a:lstStyle>
-            <a:lvl1pPr marL="0" indent="0">
-              <a:lnSpc>
-                <a:spcPct val="100000"/>
-              </a:lnSpc>
-              <a:buNone/>
-              <a:defRPr sz="1800" b="1">
-                <a:solidFill>
-                  <a:schemeClr val="bg1"/>
-                </a:solidFill>
-              </a:defRPr>
-            </a:lvl1pPr>
-            <a:lvl2pPr marL="228600" indent="-228600">
-              <a:lnSpc>
-                <a:spcPct val="100000"/>
-              </a:lnSpc>
-              <a:spcBef>
-                <a:spcPts val="1000"/>
-              </a:spcBef>
-              <a:defRPr sz="1800">
-                <a:solidFill>
-                  <a:schemeClr val="bg1"/>
-                </a:solidFill>
-              </a:defRPr>
-            </a:lvl2pPr>
-          </a:lstStyle>
-          <a:p>
-            <a:pPr lvl="0"/>
-            <a:r>
-              <a:rPr lang="en-US" dirty="0"/>
-              <a:t>Insert subtitle here</a:t>
-            </a:r>
-            <a:endParaRPr lang="en-US" dirty="0"/>
-          </a:p>
-          <a:p>
-            <a:pPr lvl="1"/>
-            <a:r>
-              <a:rPr lang="en-US" dirty="0"/>
-              <a:t>Insert content here</a:t>
-            </a:r>
-            <a:endParaRPr lang="en-US" dirty="0"/>
           </a:p>
         </p:txBody>
       </p:sp>
@@ -1547,18 +924,64 @@
           </a:prstGeom>
         </p:spPr>
       </p:pic>
+      <p:sp>
+        <p:nvSpPr>
+          <p:cNvPr id="2" name="Picture Placeholder 13">
+            <a:extLst>
+              <a:ext uri="{FF2B5EF4-FFF2-40B4-BE49-F238E27FC236}">
+                <a16:creationId xmlns:a16="http://schemas.microsoft.com/office/drawing/2014/main" id="{8DB77BCB-DD79-73B5-C2A7-642FDF818700}"/>
+              </a:ext>
+            </a:extLst>
+          </p:cNvPr>
+          <p:cNvSpPr>
+            <a:spLocks noGrp="1"/>
+          </p:cNvSpPr>
+          <p:nvPr>
+            <p:ph type="pic" sz="quarter" idx="13"/>
+          </p:nvPr>
+        </p:nvSpPr>
+        <p:spPr>
+          <a:xfrm>
+            <a:off x="5199741" y="2247899"/>
+            <a:ext cx="6476999" cy="3991059"/>
+          </a:xfrm>
+          <a:prstGeom prst="rect">
+            <a:avLst/>
+          </a:prstGeom>
+          <a:solidFill>
+            <a:schemeClr val="tx2"/>
+          </a:solidFill>
+        </p:spPr>
+        <p:txBody>
+          <a:bodyPr>
+            <a:normAutofit/>
+          </a:bodyPr>
+          <a:lstStyle>
+            <a:lvl1pPr algn="ctr">
+              <a:buNone/>
+              <a:defRPr sz="1600"/>
+            </a:lvl1pPr>
+          </a:lstStyle>
+          <a:p>
+            <a:r>
+              <a:rPr lang="en-US" dirty="0"/>
+              <a:t>Click icon to add picture</a:t>
+            </a:r>
+          </a:p>
+        </p:txBody>
+      </p:sp>
     </p:spTree>
   </p:cSld>
   <p:clrMapOvr>
     <a:masterClrMapping/>
   </p:clrMapOvr>
-  <mc:AlternateContent xmlns:mc="http://schemas.openxmlformats.org/markup-compatibility/2006">
-    <mc:Choice xmlns:p14="http://schemas.microsoft.com/office/powerpoint/2010/main" Requires="p14">
+  <mc:AlternateContent xmlns:mc="http://schemas.openxmlformats.org/markup-compatibility/2006" xmlns:p14="http://schemas.microsoft.com/office/powerpoint/2010/main">
+    <mc:Choice Requires="p14">
       <p:transition spd="med" p14:dur="700">
         <p:fade/>
       </p:transition>
     </mc:Choice>
-    <mc:Fallback>
+    <mc:Fallback xmlns="">
       <p:transition spd="med">
         <p:fade/>
       </p:transition>
@@ -1567,207 +990,9 @@
 </p:sldLayout>
 </file>
 
-<file path=ppt/slideLayouts/slideLayout6.xml><?xml version="1.0" encoding="utf-8"?>
+<file path=ppt/slideLayouts/slideLayout4.xml><?xml version="1.0" encoding="utf-8"?>
 <p:sldLayout xmlns:a="http://schemas.openxmlformats.org/drawingml/2006/main" xmlns:r="http://schemas.openxmlformats.org/officeDocument/2006/relationships" xmlns:p="http://schemas.openxmlformats.org/presentationml/2006/main" preserve="1" userDrawn="1">
-  <p:cSld name="Smart Art">
-    <p:spTree>
-      <p:nvGrpSpPr>
-        <p:cNvPr id="1" name=""/>
-        <p:cNvGrpSpPr/>
-        <p:nvPr/>
-      </p:nvGrpSpPr>
-      <p:grpSpPr>
-        <a:xfrm>
-          <a:off x="0" y="0"/>
-          <a:ext cx="0" cy="0"/>
-          <a:chOff x="0" y="0"/>
-          <a:chExt cx="0" cy="0"/>
-        </a:xfrm>
-      </p:grpSpPr>
-      <p:sp>
-        <p:nvSpPr>
-          <p:cNvPr id="2" name="Title 1"/>
-          <p:cNvSpPr>
-            <a:spLocks noGrp="1"/>
-          </p:cNvSpPr>
-          <p:nvPr>
-            <p:ph type="title" hasCustomPrompt="1"/>
-          </p:nvPr>
-        </p:nvSpPr>
-        <p:spPr>
-          <a:xfrm>
-            <a:off x="762000" y="715964"/>
-            <a:ext cx="10591800" cy="646332"/>
-          </a:xfrm>
-          <a:prstGeom prst="rect">
-            <a:avLst/>
-          </a:prstGeom>
-        </p:spPr>
-        <p:txBody>
-          <a:bodyPr>
-            <a:noAutofit/>
-          </a:bodyPr>
-          <a:lstStyle>
-            <a:lvl1pPr>
-              <a:spcBef>
-                <a:spcPts val="1000"/>
-              </a:spcBef>
-              <a:defRPr sz="4000" b="1">
-                <a:solidFill>
-                  <a:schemeClr val="accent6">
-                    <a:lumMod val="60000"/>
-                    <a:lumOff val="40000"/>
-                  </a:schemeClr>
-                </a:solidFill>
-              </a:defRPr>
-            </a:lvl1pPr>
-          </a:lstStyle>
-          <a:p>
-            <a:r>
-              <a:rPr lang="en-US" dirty="0"/>
-              <a:t>Insert title here</a:t>
-            </a:r>
-            <a:endParaRPr lang="en-US" dirty="0"/>
-          </a:p>
-        </p:txBody>
-      </p:sp>
-      <p:sp>
-        <p:nvSpPr>
-          <p:cNvPr id="7" name="Text Placeholder 15"/>
-          <p:cNvSpPr>
-            <a:spLocks noGrp="1"/>
-          </p:cNvSpPr>
-          <p:nvPr>
-            <p:ph type="body" sz="quarter" idx="11" hasCustomPrompt="1"/>
-          </p:nvPr>
-        </p:nvSpPr>
-        <p:spPr>
-          <a:xfrm>
-            <a:off x="762000" y="1432562"/>
-            <a:ext cx="10667999" cy="927425"/>
-          </a:xfrm>
-          <a:prstGeom prst="rect">
-            <a:avLst/>
-          </a:prstGeom>
-        </p:spPr>
-        <p:txBody>
-          <a:bodyPr/>
-          <a:lstStyle>
-            <a:lvl1pPr marL="0" indent="0">
-              <a:lnSpc>
-                <a:spcPct val="100000"/>
-              </a:lnSpc>
-              <a:buNone/>
-              <a:defRPr sz="1800" b="0">
-                <a:solidFill>
-                  <a:schemeClr val="bg1"/>
-                </a:solidFill>
-              </a:defRPr>
-            </a:lvl1pPr>
-            <a:lvl2pPr marL="228600">
-              <a:lnSpc>
-                <a:spcPct val="100000"/>
-              </a:lnSpc>
-              <a:spcBef>
-                <a:spcPts val="1000"/>
-              </a:spcBef>
-              <a:defRPr sz="1800" b="0">
-                <a:solidFill>
-                  <a:schemeClr val="bg1"/>
-                </a:solidFill>
-              </a:defRPr>
-            </a:lvl2pPr>
-          </a:lstStyle>
-          <a:p>
-            <a:pPr lvl="0"/>
-            <a:r>
-              <a:rPr lang="en-US" dirty="0"/>
-              <a:t>Insert subtitle here</a:t>
-            </a:r>
-            <a:endParaRPr lang="en-US" dirty="0"/>
-          </a:p>
-          <a:p>
-            <a:pPr lvl="1"/>
-            <a:r>
-              <a:rPr lang="en-US" dirty="0"/>
-              <a:t>Insert content here</a:t>
-            </a:r>
-            <a:endParaRPr lang="en-US" dirty="0"/>
-          </a:p>
-        </p:txBody>
-      </p:sp>
-      <p:sp>
-        <p:nvSpPr>
-          <p:cNvPr id="8" name="SmartArt Placeholder 7"/>
-          <p:cNvSpPr>
-            <a:spLocks noGrp="1"/>
-          </p:cNvSpPr>
-          <p:nvPr>
-            <p:ph type="dgm" sz="quarter" idx="14" hasCustomPrompt="1"/>
-          </p:nvPr>
-        </p:nvSpPr>
-        <p:spPr>
-          <a:xfrm>
-            <a:off x="762001" y="2369129"/>
-            <a:ext cx="10667998" cy="3343657"/>
-          </a:xfrm>
-          <a:prstGeom prst="rect">
-            <a:avLst/>
-          </a:prstGeom>
-        </p:spPr>
-        <p:txBody>
-          <a:bodyPr/>
-          <a:lstStyle>
-            <a:lvl1pPr marL="0" indent="0">
-              <a:buNone/>
-              <a:defRPr sz="1800" b="0"/>
-            </a:lvl1pPr>
-          </a:lstStyle>
-          <a:p>
-            <a:r>
-              <a:rPr lang="en-US" dirty="0"/>
-              <a:t>Insert Content here</a:t>
-            </a:r>
-            <a:endParaRPr lang="en-US" dirty="0"/>
-          </a:p>
-        </p:txBody>
-      </p:sp>
-      <p:pic>
-        <p:nvPicPr>
-          <p:cNvPr id="9" name="Picture Placeholder 11" descr="Bright, colorful geometric pattern "/>
-          <p:cNvPicPr>
-            <a:picLocks noChangeAspect="1"/>
-          </p:cNvPicPr>
-          <p:nvPr userDrawn="1"/>
-        </p:nvPicPr>
-        <p:blipFill>
-          <a:blip r:embed="rId2"/>
-          <a:srcRect t="390" b="390"/>
-          <a:stretch>
-            <a:fillRect/>
-          </a:stretch>
-        </p:blipFill>
-        <p:spPr>
-          <a:xfrm>
-            <a:off x="0" y="5999582"/>
-            <a:ext cx="12192000" cy="858417"/>
-          </a:xfrm>
-          <a:prstGeom prst="rect">
-            <a:avLst/>
-          </a:prstGeom>
-        </p:spPr>
-      </p:pic>
-    </p:spTree>
-  </p:cSld>
-  <p:clrMapOvr>
-    <a:masterClrMapping/>
-  </p:clrMapOvr>
-</p:sldLayout>
-</file>
-
-<file path=ppt/slideLayouts/slideLayout7.xml><?xml version="1.0" encoding="utf-8"?>
-<p:sldLayout xmlns:a="http://schemas.openxmlformats.org/drawingml/2006/main" xmlns:r="http://schemas.openxmlformats.org/officeDocument/2006/relationships" xmlns:p="http://schemas.openxmlformats.org/presentationml/2006/main" preserve="1" userDrawn="1">
-  <p:cSld name="Two Photo Content">
+  <p:cSld name="Title, Content, and Picture">
     <p:spTree>
       <p:nvGrpSpPr>
         <p:cNvPr id="1" name=""/>
@@ -1822,7 +1047,6 @@
               <a:rPr lang="en-US" dirty="0"/>
               <a:t>Insert title here</a:t>
             </a:r>
-            <a:endParaRPr lang="en-US" dirty="0"/>
           </a:p>
         </p:txBody>
       </p:sp>
@@ -1871,7 +1095,6 @@
               <a:rPr lang="en-US" dirty="0"/>
               <a:t>Insert subtitle here</a:t>
             </a:r>
-            <a:endParaRPr lang="en-US" dirty="0"/>
           </a:p>
           <a:p>
             <a:pPr lvl="1"/>
@@ -1879,7 +1102,6 @@
               <a:rPr lang="en-US" dirty="0"/>
               <a:t>Insert content here</a:t>
             </a:r>
-            <a:endParaRPr lang="en-US" dirty="0"/>
           </a:p>
         </p:txBody>
       </p:sp>
@@ -1895,8 +1117,8 @@
         </p:nvSpPr>
         <p:spPr>
           <a:xfrm>
-            <a:off x="6858000" y="715963"/>
-            <a:ext cx="4572000" cy="2362200"/>
+            <a:off x="6696159" y="723900"/>
+            <a:ext cx="5004924" cy="4457700"/>
           </a:xfrm>
           <a:prstGeom prst="rect">
             <a:avLst/>
@@ -1920,48 +1142,6 @@
               <a:rPr lang="en-US" dirty="0"/>
               <a:t>Click icon to add picture</a:t>
             </a:r>
-            <a:endParaRPr lang="en-US" dirty="0"/>
-          </a:p>
-        </p:txBody>
-      </p:sp>
-      <p:sp>
-        <p:nvSpPr>
-          <p:cNvPr id="8" name="Picture Placeholder 13"/>
-          <p:cNvSpPr>
-            <a:spLocks noGrp="1"/>
-          </p:cNvSpPr>
-          <p:nvPr>
-            <p:ph type="pic" sz="quarter" idx="13"/>
-          </p:nvPr>
-        </p:nvSpPr>
-        <p:spPr>
-          <a:xfrm>
-            <a:off x="6858000" y="3305541"/>
-            <a:ext cx="4572000" cy="2362200"/>
-          </a:xfrm>
-          <a:prstGeom prst="rect">
-            <a:avLst/>
-          </a:prstGeom>
-          <a:solidFill>
-            <a:schemeClr val="tx2"/>
-          </a:solidFill>
-        </p:spPr>
-        <p:txBody>
-          <a:bodyPr>
-            <a:normAutofit/>
-          </a:bodyPr>
-          <a:lstStyle>
-            <a:lvl1pPr algn="ctr">
-              <a:buNone/>
-              <a:defRPr sz="1600"/>
-            </a:lvl1pPr>
-          </a:lstStyle>
-          <a:p>
-            <a:r>
-              <a:rPr lang="en-US" dirty="0"/>
-              <a:t>Click icon to add picture</a:t>
-            </a:r>
-            <a:endParaRPr lang="en-US" dirty="0"/>
           </a:p>
         </p:txBody>
       </p:sp>
@@ -1998,340 +1178,6 @@
 </p:sldLayout>
 </file>
 
-<file path=ppt/slideLayouts/slideLayout8.xml><?xml version="1.0" encoding="utf-8"?>
-<p:sldLayout xmlns:a="http://schemas.openxmlformats.org/drawingml/2006/main" xmlns:r="http://schemas.openxmlformats.org/officeDocument/2006/relationships" xmlns:p="http://schemas.openxmlformats.org/presentationml/2006/main" preserve="1" userDrawn="1">
-  <p:cSld name="Right Pattern Content Blue title">
-    <p:spTree>
-      <p:nvGrpSpPr>
-        <p:cNvPr id="1" name=""/>
-        <p:cNvGrpSpPr/>
-        <p:nvPr/>
-      </p:nvGrpSpPr>
-      <p:grpSpPr>
-        <a:xfrm>
-          <a:off x="0" y="0"/>
-          <a:ext cx="0" cy="0"/>
-          <a:chOff x="0" y="0"/>
-          <a:chExt cx="0" cy="0"/>
-        </a:xfrm>
-      </p:grpSpPr>
-      <p:sp>
-        <p:nvSpPr>
-          <p:cNvPr id="2" name="Title 1"/>
-          <p:cNvSpPr>
-            <a:spLocks noGrp="1"/>
-          </p:cNvSpPr>
-          <p:nvPr>
-            <p:ph type="title" hasCustomPrompt="1"/>
-          </p:nvPr>
-        </p:nvSpPr>
-        <p:spPr>
-          <a:xfrm>
-            <a:off x="762000" y="715961"/>
-            <a:ext cx="6477000" cy="1189038"/>
-          </a:xfrm>
-          <a:prstGeom prst="rect">
-            <a:avLst/>
-          </a:prstGeom>
-        </p:spPr>
-        <p:txBody>
-          <a:bodyPr anchor="t">
-            <a:noAutofit/>
-          </a:bodyPr>
-          <a:lstStyle>
-            <a:lvl1pPr>
-              <a:spcBef>
-                <a:spcPts val="1000"/>
-              </a:spcBef>
-              <a:defRPr sz="4000" b="1">
-                <a:solidFill>
-                  <a:schemeClr val="accent5"/>
-                </a:solidFill>
-              </a:defRPr>
-            </a:lvl1pPr>
-          </a:lstStyle>
-          <a:p>
-            <a:r>
-              <a:rPr lang="en-US" dirty="0"/>
-              <a:t>Insert title here</a:t>
-            </a:r>
-            <a:endParaRPr lang="en-US" dirty="0"/>
-          </a:p>
-        </p:txBody>
-      </p:sp>
-      <p:sp>
-        <p:nvSpPr>
-          <p:cNvPr id="12" name="Text Placeholder 15"/>
-          <p:cNvSpPr>
-            <a:spLocks noGrp="1"/>
-          </p:cNvSpPr>
-          <p:nvPr>
-            <p:ph type="body" sz="quarter" idx="11" hasCustomPrompt="1"/>
-          </p:nvPr>
-        </p:nvSpPr>
-        <p:spPr>
-          <a:xfrm>
-            <a:off x="762000" y="1905000"/>
-            <a:ext cx="6477000" cy="3276600"/>
-          </a:xfrm>
-          <a:prstGeom prst="rect">
-            <a:avLst/>
-          </a:prstGeom>
-        </p:spPr>
-        <p:txBody>
-          <a:bodyPr/>
-          <a:lstStyle>
-            <a:lvl1pPr marL="0" indent="0">
-              <a:lnSpc>
-                <a:spcPct val="100000"/>
-              </a:lnSpc>
-              <a:buNone/>
-              <a:defRPr sz="1800" b="1">
-                <a:solidFill>
-                  <a:schemeClr val="bg1"/>
-                </a:solidFill>
-              </a:defRPr>
-            </a:lvl1pPr>
-            <a:lvl2pPr marL="228600">
-              <a:lnSpc>
-                <a:spcPct val="100000"/>
-              </a:lnSpc>
-              <a:spcBef>
-                <a:spcPts val="1000"/>
-              </a:spcBef>
-              <a:defRPr sz="1800">
-                <a:solidFill>
-                  <a:schemeClr val="bg1"/>
-                </a:solidFill>
-              </a:defRPr>
-            </a:lvl2pPr>
-          </a:lstStyle>
-          <a:p>
-            <a:pPr lvl="0"/>
-            <a:r>
-              <a:rPr lang="en-US" dirty="0"/>
-              <a:t>Insert subtitle here</a:t>
-            </a:r>
-            <a:endParaRPr lang="en-US" dirty="0"/>
-          </a:p>
-          <a:p>
-            <a:pPr lvl="1"/>
-            <a:r>
-              <a:rPr lang="en-US" dirty="0"/>
-              <a:t>Insert content here</a:t>
-            </a:r>
-            <a:endParaRPr lang="en-US" dirty="0"/>
-          </a:p>
-        </p:txBody>
-      </p:sp>
-      <p:pic>
-        <p:nvPicPr>
-          <p:cNvPr id="5" name="Picture Placeholder 15" descr="Bright, colorful geometric pattern "/>
-          <p:cNvPicPr>
-            <a:picLocks noChangeAspect="1"/>
-          </p:cNvPicPr>
-          <p:nvPr userDrawn="1"/>
-        </p:nvPicPr>
-        <p:blipFill rotWithShape="1">
-          <a:blip r:embed="rId2"/>
-          <a:srcRect l="3" r="3"/>
-          <a:stretch>
-            <a:fillRect/>
-          </a:stretch>
-        </p:blipFill>
-        <p:spPr>
-          <a:xfrm>
-            <a:off x="7427166" y="0"/>
-            <a:ext cx="4764834" cy="6858000"/>
-          </a:xfrm>
-          <a:prstGeom prst="rect">
-            <a:avLst/>
-          </a:prstGeom>
-        </p:spPr>
-      </p:pic>
-    </p:spTree>
-  </p:cSld>
-  <p:clrMapOvr>
-    <a:masterClrMapping/>
-  </p:clrMapOvr>
-  <mc:AlternateContent xmlns:mc="http://schemas.openxmlformats.org/markup-compatibility/2006">
-    <mc:Choice xmlns:p14="http://schemas.microsoft.com/office/powerpoint/2010/main" Requires="p14">
-      <p:transition spd="med" p14:dur="700">
-        <p:fade/>
-      </p:transition>
-    </mc:Choice>
-    <mc:Fallback>
-      <p:transition spd="med">
-        <p:fade/>
-      </p:transition>
-    </mc:Fallback>
-  </mc:AlternateContent>
-</p:sldLayout>
-</file>
-
-<file path=ppt/slideLayouts/slideLayout9.xml><?xml version="1.0" encoding="utf-8"?>
-<p:sldLayout xmlns:a="http://schemas.openxmlformats.org/drawingml/2006/main" xmlns:r="http://schemas.openxmlformats.org/officeDocument/2006/relationships" xmlns:p="http://schemas.openxmlformats.org/presentationml/2006/main" preserve="1" userDrawn="1">
-  <p:cSld name="Questions">
-    <p:spTree>
-      <p:nvGrpSpPr>
-        <p:cNvPr id="1" name=""/>
-        <p:cNvGrpSpPr/>
-        <p:nvPr/>
-      </p:nvGrpSpPr>
-      <p:grpSpPr>
-        <a:xfrm>
-          <a:off x="0" y="0"/>
-          <a:ext cx="0" cy="0"/>
-          <a:chOff x="0" y="0"/>
-          <a:chExt cx="0" cy="0"/>
-        </a:xfrm>
-      </p:grpSpPr>
-      <p:sp>
-        <p:nvSpPr>
-          <p:cNvPr id="5" name="Title 1"/>
-          <p:cNvSpPr>
-            <a:spLocks noGrp="1"/>
-          </p:cNvSpPr>
-          <p:nvPr>
-            <p:ph type="title" hasCustomPrompt="1"/>
-          </p:nvPr>
-        </p:nvSpPr>
-        <p:spPr>
-          <a:xfrm>
-            <a:off x="1525301" y="1995467"/>
-            <a:ext cx="9141397" cy="615553"/>
-          </a:xfrm>
-          <a:prstGeom prst="rect">
-            <a:avLst/>
-          </a:prstGeom>
-          <a:noFill/>
-        </p:spPr>
-        <p:txBody>
-          <a:bodyPr wrap="square" lIns="0" tIns="0" rIns="0" bIns="0" anchor="b" anchorCtr="0">
-            <a:spAutoFit/>
-          </a:bodyPr>
-          <a:lstStyle>
-            <a:lvl1pPr algn="ctr" defTabSz="932815" rtl="0" eaLnBrk="1" latinLnBrk="0" hangingPunct="1">
-              <a:lnSpc>
-                <a:spcPct val="100000"/>
-              </a:lnSpc>
-              <a:spcBef>
-                <a:spcPct val="0"/>
-              </a:spcBef>
-              <a:buNone/>
-              <a:defRPr lang="en-US" sz="4000" b="1" i="0" kern="1200" cap="none" spc="-50" baseline="0" dirty="0">
-                <a:ln w="3175">
-                  <a:noFill/>
-                </a:ln>
-                <a:solidFill>
-                  <a:schemeClr val="bg1"/>
-                </a:solidFill>
-                <a:effectLst/>
-                <a:latin typeface="+mj-lt"/>
-                <a:ea typeface="+mn-ea"/>
-                <a:cs typeface="Segoe UI" panose="020B0502040204020203" pitchFamily="34" charset="0"/>
-              </a:defRPr>
-            </a:lvl1pPr>
-          </a:lstStyle>
-          <a:p>
-            <a:r>
-              <a:rPr lang="en-US" dirty="0"/>
-              <a:t>Insert title here</a:t>
-            </a:r>
-            <a:endParaRPr lang="en-US" dirty="0"/>
-          </a:p>
-        </p:txBody>
-      </p:sp>
-      <p:sp>
-        <p:nvSpPr>
-          <p:cNvPr id="14" name="Text Placeholder 4"/>
-          <p:cNvSpPr>
-            <a:spLocks noGrp="1"/>
-          </p:cNvSpPr>
-          <p:nvPr>
-            <p:ph type="body" sz="quarter" idx="12" hasCustomPrompt="1"/>
-          </p:nvPr>
-        </p:nvSpPr>
-        <p:spPr>
-          <a:xfrm>
-            <a:off x="2196307" y="3260705"/>
-            <a:ext cx="7799387" cy="1534757"/>
-          </a:xfrm>
-          <a:prstGeom prst="rect">
-            <a:avLst/>
-          </a:prstGeom>
-          <a:noFill/>
-        </p:spPr>
-        <p:txBody>
-          <a:bodyPr wrap="square" lIns="0" tIns="0" rIns="0" bIns="0">
-            <a:noAutofit/>
-          </a:bodyPr>
-          <a:lstStyle>
-            <a:lvl1pPr marL="0" indent="0" algn="ctr">
-              <a:lnSpc>
-                <a:spcPct val="100000"/>
-              </a:lnSpc>
-              <a:spcBef>
-                <a:spcPts val="0"/>
-              </a:spcBef>
-              <a:spcAft>
-                <a:spcPts val="0"/>
-              </a:spcAft>
-              <a:buFont typeface="Arial" panose="020B0604020202020204" pitchFamily="34" charset="0"/>
-              <a:buNone/>
-              <a:defRPr lang="en-US" sz="1800" kern="1200" dirty="0">
-                <a:solidFill>
-                  <a:schemeClr val="bg1"/>
-                </a:solidFill>
-                <a:latin typeface="+mn-lt"/>
-                <a:ea typeface="+mn-ea"/>
-                <a:cs typeface="+mn-cs"/>
-              </a:defRPr>
-            </a:lvl1pPr>
-          </a:lstStyle>
-          <a:p>
-            <a:pPr lvl="0"/>
-            <a:r>
-              <a:rPr lang="en-US" dirty="0"/>
-              <a:t>Insert content here</a:t>
-            </a:r>
-            <a:endParaRPr lang="en-US" dirty="0"/>
-          </a:p>
-        </p:txBody>
-      </p:sp>
-      <p:pic>
-        <p:nvPicPr>
-          <p:cNvPr id="6" name="Picture Placeholder 17" descr="Bright, colorful geometric pattern "/>
-          <p:cNvPicPr>
-            <a:picLocks noChangeAspect="1"/>
-          </p:cNvPicPr>
-          <p:nvPr userDrawn="1"/>
-        </p:nvPicPr>
-        <p:blipFill rotWithShape="1">
-          <a:blip r:embed="rId2"/>
-          <a:srcRect t="390" b="390"/>
-          <a:stretch>
-            <a:fillRect/>
-          </a:stretch>
-        </p:blipFill>
-        <p:spPr>
-          <a:xfrm>
-            <a:off x="0" y="5999582"/>
-            <a:ext cx="12192000" cy="858417"/>
-          </a:xfrm>
-          <a:prstGeom prst="rect">
-            <a:avLst/>
-          </a:prstGeom>
-        </p:spPr>
-      </p:pic>
-    </p:spTree>
-  </p:cSld>
-  <p:clrMapOvr>
-    <a:masterClrMapping/>
-  </p:clrMapOvr>
-</p:sldLayout>
-</file>
-
 <file path=ppt/slideMasters/slideMaster1.xml><?xml version="1.0" encoding="utf-8"?>
 <p:sldMaster xmlns:a="http://schemas.openxmlformats.org/drawingml/2006/main" xmlns:r="http://schemas.openxmlformats.org/officeDocument/2006/relationships" xmlns:p="http://schemas.openxmlformats.org/presentationml/2006/main">
   <p:cSld>
@@ -2363,14 +1209,8 @@
   <p:sldLayoutIdLst>
     <p:sldLayoutId id="2147483649" r:id="rId1"/>
     <p:sldLayoutId id="2147483650" r:id="rId2"/>
-    <p:sldLayoutId id="2147483651" r:id="rId3"/>
-    <p:sldLayoutId id="2147483652" r:id="rId4"/>
-    <p:sldLayoutId id="2147483653" r:id="rId5"/>
-    <p:sldLayoutId id="2147483654" r:id="rId6"/>
-    <p:sldLayoutId id="2147483655" r:id="rId7"/>
-    <p:sldLayoutId id="2147483656" r:id="rId8"/>
-    <p:sldLayoutId id="2147483657" r:id="rId9"/>
-    <p:sldLayoutId id="2147483658" r:id="rId10"/>
+    <p:sldLayoutId id="2147483653" r:id="rId3"/>
+    <p:sldLayoutId id="2147483655" r:id="rId4"/>
   </p:sldLayoutIdLst>
   <p:txStyles>
     <p:titleStyle>
@@ -2655,9 +1495,9 @@
 </p:sldMaster>
 </file>
 
-<file path=ppt/tags/tag4.xml><?xml version="1.0" encoding="utf-8"?>
-<p:tagLst xmlns:p="http://schemas.openxmlformats.org/presentationml/2006/main">
-  <p:tag name="commondata" val="eyJoZGlkIjoiODJjZmY5NTJmY2IzZTViNTMyYzRlZGMzMDg2MzhjZjQifQ=="/>
+<file path=ppt/tags/tag1.xml><?xml version="1.0" encoding="utf-8"?>
+<p:tagLst xmlns:a="http://schemas.openxmlformats.org/drawingml/2006/main" xmlns:r="http://schemas.openxmlformats.org/officeDocument/2006/relationships" xmlns:p="http://schemas.openxmlformats.org/presentationml/2006/main">
+  <p:tag name="COMMONDATA" val="eyJoZGlkIjoiODJjZmY5NTJmY2IzZTViNTMyYzRlZGMzMDg2MzhjZjQifQ=="/>
 </p:tagLst>
 </file>
 
@@ -2852,6 +1692,8 @@
       </a:bgFillStyleLst>
     </a:fmtScheme>
   </a:themeElements>
+  <a:objectDefaults/>
+  <a:extraClrSchemeLst/>
   <a:extLst>
     <a:ext uri="{05A4C25C-085E-4340-85A3-A5531E510DB2}">
       <thm15:themeFamily xmlns:thm15="http://schemas.microsoft.com/office/thememl/2012/main" name="Office Theme" id="{62F939B6-93AF-4DB8-9C6B-D6C7DFDC589F}" vid="{4A3C46E8-61CC-4603-A589-7422A47A8E4A}"/>
@@ -3138,6 +1980,8 @@
       </a:bgFillStyleLst>
     </a:fmtScheme>
   </a:themeElements>
+  <a:objectDefaults/>
+  <a:extraClrSchemeLst/>
   <a:extLst>
     <a:ext uri="{05A4C25C-085E-4340-85A3-A5531E510DB2}">
       <thm15:themeFamily xmlns:thm15="http://schemas.microsoft.com/office/thememl/2012/main" name="Office Theme" id="{62F939B6-93AF-4DB8-9C6B-D6C7DFDC589F}" vid="{4A3C46E8-61CC-4603-A589-7422A47A8E4A}"/>
@@ -3147,6 +1991,35 @@
 </file>
 
 <file path=customXml/item1.xml><?xml version="1.0" encoding="utf-8"?>
+<p:properties xmlns:p="http://schemas.microsoft.com/office/2006/metadata/properties" xmlns:xsi="http://www.w3.org/2001/XMLSchema-instance" xmlns:pc="http://schemas.microsoft.com/office/infopath/2007/PartnerControls">
+  <documentManagement>
+    <_ip_UnifiedCompliancePolicyUIAction xmlns="http://schemas.microsoft.com/sharepoint/v3" xsi:nil="true"/>
+    <Image xmlns="71af3243-3dd4-4a8d-8c0d-dd76da1f02a5">
+      <Url xsi:nil="true"/>
+      <Description xsi:nil="true"/>
+    </Image>
+    <Status xmlns="71af3243-3dd4-4a8d-8c0d-dd76da1f02a5">Not started</Status>
+    <Background xmlns="71af3243-3dd4-4a8d-8c0d-dd76da1f02a5">false</Background>
+    <_ip_UnifiedCompliancePolicyProperties xmlns="http://schemas.microsoft.com/sharepoint/v3" xsi:nil="true"/>
+    <ImageTagsTaxHTField xmlns="71af3243-3dd4-4a8d-8c0d-dd76da1f02a5">
+      <Terms xmlns="http://schemas.microsoft.com/office/infopath/2007/PartnerControls"/>
+    </ImageTagsTaxHTField>
+    <TaxCatchAll xmlns="230e9df3-be65-4c73-a93b-d1236ebd677e" xsi:nil="true"/>
+    <MediaServiceKeyPoints xmlns="71af3243-3dd4-4a8d-8c0d-dd76da1f02a5" xsi:nil="true"/>
+  </documentManagement>
+</p:properties>
+</file>
+
+<file path=customXml/item2.xml><?xml version="1.0" encoding="utf-8"?>
+<?mso-contentType ?>
+<FormTemplates xmlns="http://schemas.microsoft.com/sharepoint/v3/contenttype/forms">
+  <Display>DocumentLibraryForm</Display>
+  <Edit>DocumentLibraryForm</Edit>
+  <New>DocumentLibraryForm</New>
+</FormTemplates>
+</file>
+
+<file path=customXml/item3.xml><?xml version="1.0" encoding="utf-8"?>
 <ct:contentTypeSchema xmlns:ct="http://schemas.microsoft.com/office/2006/metadata/contentType" xmlns:ma="http://schemas.microsoft.com/office/2006/metadata/properties/metaAttributes" ct:_="" ma:_="" ma:contentTypeName="Document" ma:contentTypeID="0x01010079F111ED35F8CC479449609E8A0923A6" ma:contentTypeVersion="24" ma:contentTypeDescription="Create a new document." ma:contentTypeScope="" ma:versionID="2d714a3296df14eba7a100bb665443ca">
   <xsd:schema xmlns:xsd="http://www.w3.org/2001/XMLSchema" xmlns:xs="http://www.w3.org/2001/XMLSchema" xmlns:p="http://schemas.microsoft.com/office/2006/metadata/properties" xmlns:ns1="http://schemas.microsoft.com/sharepoint/v3" xmlns:ns2="71af3243-3dd4-4a8d-8c0d-dd76da1f02a5" xmlns:ns3="16c05727-aa75-4e4a-9b5f-8a80a1165891" xmlns:ns4="230e9df3-be65-4c73-a93b-d1236ebd677e" targetNamespace="http://schemas.microsoft.com/office/2006/metadata/properties" ma:root="true" ma:fieldsID="49549bf45bfbbfb6cffed527380e77e1" ns1:_="" ns2:_="" ns3:_="" ns4:_="">
     <xsd:import namespace="http://schemas.microsoft.com/sharepoint/v3"/>
@@ -3434,37 +2307,8 @@
 </ct:contentTypeSchema>
 </file>
 
-<file path=customXml/item2.xml><?xml version="1.0" encoding="utf-8"?>
-<?mso-contentType ?>
-<FormTemplates xmlns="http://schemas.microsoft.com/sharepoint/v3/contenttype/forms">
-  <Display>DocumentLibraryForm</Display>
-  <Edit>DocumentLibraryForm</Edit>
-  <New>DocumentLibraryForm</New>
-</FormTemplates>
-</file>
-
-<file path=customXml/item3.xml><?xml version="1.0" encoding="utf-8"?>
-<p:properties xmlns:p="http://schemas.microsoft.com/office/2006/metadata/properties" xmlns:xsi="http://www.w3.org/2001/XMLSchema-instance" xmlns:pc="http://schemas.microsoft.com/office/infopath/2007/PartnerControls">
-  <documentManagement>
-    <_ip_UnifiedCompliancePolicyUIAction xmlns="http://schemas.microsoft.com/sharepoint/v3" xsi:nil="true"/>
-    <Image xmlns="71af3243-3dd4-4a8d-8c0d-dd76da1f02a5">
-      <Url xsi:nil="true"/>
-      <Description xsi:nil="true"/>
-    </Image>
-    <Status xmlns="71af3243-3dd4-4a8d-8c0d-dd76da1f02a5">Not started</Status>
-    <Background xmlns="71af3243-3dd4-4a8d-8c0d-dd76da1f02a5">false</Background>
-    <_ip_UnifiedCompliancePolicyProperties xmlns="http://schemas.microsoft.com/sharepoint/v3" xsi:nil="true"/>
-    <ImageTagsTaxHTField xmlns="71af3243-3dd4-4a8d-8c0d-dd76da1f02a5">
-      <Terms xmlns="http://schemas.microsoft.com/office/infopath/2007/PartnerControls"/>
-    </ImageTagsTaxHTField>
-    <TaxCatchAll xmlns="230e9df3-be65-4c73-a93b-d1236ebd677e" xsi:nil="true"/>
-    <MediaServiceKeyPoints xmlns="71af3243-3dd4-4a8d-8c0d-dd76da1f02a5" xsi:nil="true"/>
-  </documentManagement>
-</p:properties>
-</file>
-
 <file path=customXml/itemProps1.xml><?xml version="1.0" encoding="utf-8"?>
-<ds:datastoreItem xmlns:ds="http://schemas.openxmlformats.org/officeDocument/2006/customXml" ds:itemID="{08D17C5B-66E3-4784-8825-129A0E305F7F}">
+<ds:datastoreItem xmlns:ds="http://schemas.openxmlformats.org/officeDocument/2006/customXml" ds:itemID="{ACD97AF3-310A-4DBA-AAE4-E94EC92F74FE}">
   <ds:schemaRefs/>
 </ds:datastoreItem>
 </file>
@@ -3476,7 +2320,7 @@
 </file>
 
 <file path=customXml/itemProps3.xml><?xml version="1.0" encoding="utf-8"?>
-<ds:datastoreItem xmlns:ds="http://schemas.openxmlformats.org/officeDocument/2006/customXml" ds:itemID="{ACD97AF3-310A-4DBA-AAE4-E94EC92F74FE}">
+<ds:datastoreItem xmlns:ds="http://schemas.openxmlformats.org/officeDocument/2006/customXml" ds:itemID="{08D17C5B-66E3-4784-8825-129A0E305F7F}">
   <ds:schemaRefs/>
 </ds:datastoreItem>
 </file>
</xml_diff>